<commit_message>
new ver of All MLs
</commit_message>
<xml_diff>
--- a/Mini-Project.pptx
+++ b/Mini-Project.pptx
@@ -5,7 +5,7 @@
     <p:sldMasterId id="2147483660" r:id="rId1"/>
   </p:sldMasterIdLst>
   <p:notesMasterIdLst>
-    <p:notesMasterId r:id="rId13"/>
+    <p:notesMasterId r:id="rId16"/>
   </p:notesMasterIdLst>
   <p:sldIdLst>
     <p:sldId id="256" r:id="rId2"/>
@@ -19,6 +19,9 @@
     <p:sldId id="264" r:id="rId10"/>
     <p:sldId id="265" r:id="rId11"/>
     <p:sldId id="266" r:id="rId12"/>
+    <p:sldId id="267" r:id="rId13"/>
+    <p:sldId id="268" r:id="rId14"/>
+    <p:sldId id="269" r:id="rId15"/>
   </p:sldIdLst>
   <p:sldSz cx="12192000" cy="6858000"/>
   <p:notesSz cx="6858000" cy="9144000"/>
@@ -207,7 +210,7 @@
           <a:p>
             <a:fld id="{BC0EFADE-73B6-2446-AB9D-1234C578992C}" type="datetimeFigureOut">
               <a:rPr lang="en-US" smtClean="0"/>
-              <a:t>7/16/24</a:t>
+              <a:t>8/9/24</a:t>
             </a:fld>
             <a:endParaRPr lang="en-US"/>
           </a:p>
@@ -579,6 +582,174 @@
 </p:notes>
 </file>
 
+<file path=ppt/notesSlides/notesSlide10.xml><?xml version="1.0" encoding="utf-8"?>
+<p:notes xmlns:a="http://schemas.openxmlformats.org/drawingml/2006/main" xmlns:r="http://schemas.openxmlformats.org/officeDocument/2006/relationships" xmlns:p="http://schemas.openxmlformats.org/presentationml/2006/main">
+  <p:cSld>
+    <p:spTree>
+      <p:nvGrpSpPr>
+        <p:cNvPr id="1" name=""/>
+        <p:cNvGrpSpPr/>
+        <p:nvPr/>
+      </p:nvGrpSpPr>
+      <p:grpSpPr>
+        <a:xfrm>
+          <a:off x="0" y="0"/>
+          <a:ext cx="0" cy="0"/>
+          <a:chOff x="0" y="0"/>
+          <a:chExt cx="0" cy="0"/>
+        </a:xfrm>
+      </p:grpSpPr>
+      <p:sp>
+        <p:nvSpPr>
+          <p:cNvPr id="2" name="Slide Image Placeholder 1"/>
+          <p:cNvSpPr>
+            <a:spLocks noGrp="1" noRot="1" noChangeAspect="1"/>
+          </p:cNvSpPr>
+          <p:nvPr>
+            <p:ph type="sldImg"/>
+          </p:nvPr>
+        </p:nvSpPr>
+        <p:spPr/>
+      </p:sp>
+      <p:sp>
+        <p:nvSpPr>
+          <p:cNvPr id="3" name="Notes Placeholder 2"/>
+          <p:cNvSpPr>
+            <a:spLocks noGrp="1"/>
+          </p:cNvSpPr>
+          <p:nvPr>
+            <p:ph type="body" idx="1"/>
+          </p:nvPr>
+        </p:nvSpPr>
+        <p:spPr/>
+        <p:txBody>
+          <a:bodyPr/>
+          <a:lstStyle/>
+          <a:p>
+            <a:endParaRPr lang="en-US" dirty="0"/>
+          </a:p>
+        </p:txBody>
+      </p:sp>
+      <p:sp>
+        <p:nvSpPr>
+          <p:cNvPr id="4" name="Slide Number Placeholder 3"/>
+          <p:cNvSpPr>
+            <a:spLocks noGrp="1"/>
+          </p:cNvSpPr>
+          <p:nvPr>
+            <p:ph type="sldNum" sz="quarter" idx="5"/>
+          </p:nvPr>
+        </p:nvSpPr>
+        <p:spPr/>
+        <p:txBody>
+          <a:bodyPr/>
+          <a:lstStyle/>
+          <a:p>
+            <a:fld id="{C7E45814-62A0-CF4E-862B-93ACED20F3EA}" type="slidenum">
+              <a:rPr lang="en-US" smtClean="0"/>
+              <a:t>13</a:t>
+            </a:fld>
+            <a:endParaRPr lang="en-US"/>
+          </a:p>
+        </p:txBody>
+      </p:sp>
+    </p:spTree>
+    <p:extLst>
+      <p:ext uri="{BB962C8B-B14F-4D97-AF65-F5344CB8AC3E}">
+        <p14:creationId xmlns:p14="http://schemas.microsoft.com/office/powerpoint/2010/main" val="1174204361"/>
+      </p:ext>
+    </p:extLst>
+  </p:cSld>
+  <p:clrMapOvr>
+    <a:masterClrMapping/>
+  </p:clrMapOvr>
+</p:notes>
+</file>
+
+<file path=ppt/notesSlides/notesSlide11.xml><?xml version="1.0" encoding="utf-8"?>
+<p:notes xmlns:a="http://schemas.openxmlformats.org/drawingml/2006/main" xmlns:r="http://schemas.openxmlformats.org/officeDocument/2006/relationships" xmlns:p="http://schemas.openxmlformats.org/presentationml/2006/main">
+  <p:cSld>
+    <p:spTree>
+      <p:nvGrpSpPr>
+        <p:cNvPr id="1" name=""/>
+        <p:cNvGrpSpPr/>
+        <p:nvPr/>
+      </p:nvGrpSpPr>
+      <p:grpSpPr>
+        <a:xfrm>
+          <a:off x="0" y="0"/>
+          <a:ext cx="0" cy="0"/>
+          <a:chOff x="0" y="0"/>
+          <a:chExt cx="0" cy="0"/>
+        </a:xfrm>
+      </p:grpSpPr>
+      <p:sp>
+        <p:nvSpPr>
+          <p:cNvPr id="2" name="Slide Image Placeholder 1"/>
+          <p:cNvSpPr>
+            <a:spLocks noGrp="1" noRot="1" noChangeAspect="1"/>
+          </p:cNvSpPr>
+          <p:nvPr>
+            <p:ph type="sldImg"/>
+          </p:nvPr>
+        </p:nvSpPr>
+        <p:spPr/>
+      </p:sp>
+      <p:sp>
+        <p:nvSpPr>
+          <p:cNvPr id="3" name="Notes Placeholder 2"/>
+          <p:cNvSpPr>
+            <a:spLocks noGrp="1"/>
+          </p:cNvSpPr>
+          <p:nvPr>
+            <p:ph type="body" idx="1"/>
+          </p:nvPr>
+        </p:nvSpPr>
+        <p:spPr/>
+        <p:txBody>
+          <a:bodyPr/>
+          <a:lstStyle/>
+          <a:p>
+            <a:endParaRPr lang="en-US" dirty="0"/>
+          </a:p>
+        </p:txBody>
+      </p:sp>
+      <p:sp>
+        <p:nvSpPr>
+          <p:cNvPr id="4" name="Slide Number Placeholder 3"/>
+          <p:cNvSpPr>
+            <a:spLocks noGrp="1"/>
+          </p:cNvSpPr>
+          <p:nvPr>
+            <p:ph type="sldNum" sz="quarter" idx="5"/>
+          </p:nvPr>
+        </p:nvSpPr>
+        <p:spPr/>
+        <p:txBody>
+          <a:bodyPr/>
+          <a:lstStyle/>
+          <a:p>
+            <a:fld id="{C7E45814-62A0-CF4E-862B-93ACED20F3EA}" type="slidenum">
+              <a:rPr lang="en-US" smtClean="0"/>
+              <a:t>14</a:t>
+            </a:fld>
+            <a:endParaRPr lang="en-US"/>
+          </a:p>
+        </p:txBody>
+      </p:sp>
+    </p:spTree>
+    <p:extLst>
+      <p:ext uri="{BB962C8B-B14F-4D97-AF65-F5344CB8AC3E}">
+        <p14:creationId xmlns:p14="http://schemas.microsoft.com/office/powerpoint/2010/main" val="1437506851"/>
+      </p:ext>
+    </p:extLst>
+  </p:cSld>
+  <p:clrMapOvr>
+    <a:masterClrMapping/>
+  </p:clrMapOvr>
+</p:notes>
+</file>
+
 <file path=ppt/notesSlides/notesSlide2.xml><?xml version="1.0" encoding="utf-8"?>
 <p:notes xmlns:a="http://schemas.openxmlformats.org/drawingml/2006/main" xmlns:r="http://schemas.openxmlformats.org/officeDocument/2006/relationships" xmlns:p="http://schemas.openxmlformats.org/presentationml/2006/main">
   <p:cSld>
@@ -4515,6 +4686,90 @@
     <p:extLst>
       <p:ext uri="{BB962C8B-B14F-4D97-AF65-F5344CB8AC3E}">
         <p14:creationId xmlns:p14="http://schemas.microsoft.com/office/powerpoint/2010/main" val="1381532123"/>
+      </p:ext>
+    </p:extLst>
+  </p:cSld>
+  <p:clrMapOvr>
+    <a:masterClrMapping/>
+  </p:clrMapOvr>
+</p:notes>
+</file>
+
+<file path=ppt/notesSlides/notesSlide9.xml><?xml version="1.0" encoding="utf-8"?>
+<p:notes xmlns:a="http://schemas.openxmlformats.org/drawingml/2006/main" xmlns:r="http://schemas.openxmlformats.org/officeDocument/2006/relationships" xmlns:p="http://schemas.openxmlformats.org/presentationml/2006/main">
+  <p:cSld>
+    <p:spTree>
+      <p:nvGrpSpPr>
+        <p:cNvPr id="1" name=""/>
+        <p:cNvGrpSpPr/>
+        <p:nvPr/>
+      </p:nvGrpSpPr>
+      <p:grpSpPr>
+        <a:xfrm>
+          <a:off x="0" y="0"/>
+          <a:ext cx="0" cy="0"/>
+          <a:chOff x="0" y="0"/>
+          <a:chExt cx="0" cy="0"/>
+        </a:xfrm>
+      </p:grpSpPr>
+      <p:sp>
+        <p:nvSpPr>
+          <p:cNvPr id="2" name="Slide Image Placeholder 1"/>
+          <p:cNvSpPr>
+            <a:spLocks noGrp="1" noRot="1" noChangeAspect="1"/>
+          </p:cNvSpPr>
+          <p:nvPr>
+            <p:ph type="sldImg"/>
+          </p:nvPr>
+        </p:nvSpPr>
+        <p:spPr/>
+      </p:sp>
+      <p:sp>
+        <p:nvSpPr>
+          <p:cNvPr id="3" name="Notes Placeholder 2"/>
+          <p:cNvSpPr>
+            <a:spLocks noGrp="1"/>
+          </p:cNvSpPr>
+          <p:nvPr>
+            <p:ph type="body" idx="1"/>
+          </p:nvPr>
+        </p:nvSpPr>
+        <p:spPr/>
+        <p:txBody>
+          <a:bodyPr/>
+          <a:lstStyle/>
+          <a:p>
+            <a:endParaRPr lang="en-US" dirty="0"/>
+          </a:p>
+        </p:txBody>
+      </p:sp>
+      <p:sp>
+        <p:nvSpPr>
+          <p:cNvPr id="4" name="Slide Number Placeholder 3"/>
+          <p:cNvSpPr>
+            <a:spLocks noGrp="1"/>
+          </p:cNvSpPr>
+          <p:nvPr>
+            <p:ph type="sldNum" sz="quarter" idx="5"/>
+          </p:nvPr>
+        </p:nvSpPr>
+        <p:spPr/>
+        <p:txBody>
+          <a:bodyPr/>
+          <a:lstStyle/>
+          <a:p>
+            <a:fld id="{C7E45814-62A0-CF4E-862B-93ACED20F3EA}" type="slidenum">
+              <a:rPr lang="en-US" smtClean="0"/>
+              <a:t>12</a:t>
+            </a:fld>
+            <a:endParaRPr lang="en-US"/>
+          </a:p>
+        </p:txBody>
+      </p:sp>
+    </p:spTree>
+    <p:extLst>
+      <p:ext uri="{BB962C8B-B14F-4D97-AF65-F5344CB8AC3E}">
+        <p14:creationId xmlns:p14="http://schemas.microsoft.com/office/powerpoint/2010/main" val="3518866356"/>
       </p:ext>
     </p:extLst>
   </p:cSld>
@@ -4655,7 +4910,7 @@
           <a:p>
             <a:fld id="{48A87A34-81AB-432B-8DAE-1953F412C126}" type="datetimeFigureOut">
               <a:rPr lang="en-US" smtClean="0"/>
-              <a:t>7/16/24</a:t>
+              <a:t>8/9/24</a:t>
             </a:fld>
             <a:endParaRPr lang="en-US" dirty="0"/>
           </a:p>
@@ -4825,7 +5080,7 @@
           <a:p>
             <a:fld id="{48A87A34-81AB-432B-8DAE-1953F412C126}" type="datetimeFigureOut">
               <a:rPr lang="en-US" smtClean="0"/>
-              <a:t>7/16/24</a:t>
+              <a:t>8/9/24</a:t>
             </a:fld>
             <a:endParaRPr lang="en-US" dirty="0"/>
           </a:p>
@@ -5005,7 +5260,7 @@
           <a:p>
             <a:fld id="{48A87A34-81AB-432B-8DAE-1953F412C126}" type="datetimeFigureOut">
               <a:rPr lang="en-US" smtClean="0"/>
-              <a:t>7/16/24</a:t>
+              <a:t>8/9/24</a:t>
             </a:fld>
             <a:endParaRPr lang="en-US" dirty="0"/>
           </a:p>
@@ -5175,7 +5430,7 @@
           <a:p>
             <a:fld id="{48A87A34-81AB-432B-8DAE-1953F412C126}" type="datetimeFigureOut">
               <a:rPr lang="en-US" smtClean="0"/>
-              <a:t>7/16/24</a:t>
+              <a:t>8/9/24</a:t>
             </a:fld>
             <a:endParaRPr lang="en-US" dirty="0"/>
           </a:p>
@@ -5421,7 +5676,7 @@
           <a:p>
             <a:fld id="{48A87A34-81AB-432B-8DAE-1953F412C126}" type="datetimeFigureOut">
               <a:rPr lang="en-US" smtClean="0"/>
-              <a:t>7/16/24</a:t>
+              <a:t>8/9/24</a:t>
             </a:fld>
             <a:endParaRPr lang="en-US" dirty="0"/>
           </a:p>
@@ -5653,7 +5908,7 @@
           <a:p>
             <a:fld id="{48A87A34-81AB-432B-8DAE-1953F412C126}" type="datetimeFigureOut">
               <a:rPr lang="en-US" smtClean="0"/>
-              <a:t>7/16/24</a:t>
+              <a:t>8/9/24</a:t>
             </a:fld>
             <a:endParaRPr lang="en-US" dirty="0"/>
           </a:p>
@@ -6020,7 +6275,7 @@
           <a:p>
             <a:fld id="{48A87A34-81AB-432B-8DAE-1953F412C126}" type="datetimeFigureOut">
               <a:rPr lang="en-US" smtClean="0"/>
-              <a:t>7/16/24</a:t>
+              <a:t>8/9/24</a:t>
             </a:fld>
             <a:endParaRPr lang="en-US" dirty="0"/>
           </a:p>
@@ -6138,7 +6393,7 @@
           <a:p>
             <a:fld id="{48A87A34-81AB-432B-8DAE-1953F412C126}" type="datetimeFigureOut">
               <a:rPr lang="en-US" smtClean="0"/>
-              <a:t>7/16/24</a:t>
+              <a:t>8/9/24</a:t>
             </a:fld>
             <a:endParaRPr lang="en-US" dirty="0"/>
           </a:p>
@@ -6233,7 +6488,7 @@
           <a:p>
             <a:fld id="{48A87A34-81AB-432B-8DAE-1953F412C126}" type="datetimeFigureOut">
               <a:rPr lang="en-US" smtClean="0"/>
-              <a:t>7/16/24</a:t>
+              <a:t>8/9/24</a:t>
             </a:fld>
             <a:endParaRPr lang="en-US" dirty="0"/>
           </a:p>
@@ -6510,7 +6765,7 @@
           <a:p>
             <a:fld id="{48A87A34-81AB-432B-8DAE-1953F412C126}" type="datetimeFigureOut">
               <a:rPr lang="en-US" smtClean="0"/>
-              <a:t>7/16/24</a:t>
+              <a:t>8/9/24</a:t>
             </a:fld>
             <a:endParaRPr lang="en-US" dirty="0"/>
           </a:p>
@@ -6768,7 +7023,7 @@
             <a:fld id="{48A87A34-81AB-432B-8DAE-1953F412C126}" type="datetimeFigureOut">
               <a:rPr lang="en-US" smtClean="0"/>
               <a:pPr/>
-              <a:t>7/16/24</a:t>
+              <a:t>8/9/24</a:t>
             </a:fld>
             <a:endParaRPr lang="en-US" dirty="0"/>
           </a:p>
@@ -6982,7 +7237,7 @@
             <a:fld id="{48A87A34-81AB-432B-8DAE-1953F412C126}" type="datetimeFigureOut">
               <a:rPr lang="en-US" smtClean="0"/>
               <a:pPr/>
-              <a:t>7/16/24</a:t>
+              <a:t>8/9/24</a:t>
             </a:fld>
             <a:endParaRPr lang="en-US" dirty="0"/>
           </a:p>
@@ -7411,7 +7666,7 @@
           <a:p>
             <a:r>
               <a:rPr lang="en-US" dirty="0"/>
-              <a:t>Mini PROJECT – 1- EDA</a:t>
+              <a:t>Mini PROJECT – 2- ML</a:t>
             </a:r>
           </a:p>
         </p:txBody>
@@ -7503,12 +7758,8 @@
           <a:lstStyle/>
           <a:p>
             <a:r>
-              <a:rPr lang="en-US" dirty="0" err="1"/>
-              <a:t>Visualisation</a:t>
-            </a:r>
-            <a:r>
               <a:rPr lang="en-US" dirty="0"/>
-              <a:t> – </a:t>
+              <a:t>Visualization – </a:t>
             </a:r>
             <a:r>
               <a:rPr lang="en-US" sz="3600" dirty="0"/>
@@ -7697,12 +7948,8 @@
           <a:lstStyle/>
           <a:p>
             <a:r>
-              <a:rPr lang="en-US" dirty="0" err="1"/>
-              <a:t>Visualisation</a:t>
-            </a:r>
-            <a:r>
               <a:rPr lang="en-US" dirty="0"/>
-              <a:t> – </a:t>
+              <a:t>Visualization – </a:t>
             </a:r>
             <a:r>
               <a:rPr lang="en-US" sz="3600" dirty="0"/>
@@ -7836,6 +8083,524 @@
     <p:extLst>
       <p:ext uri="{BB962C8B-B14F-4D97-AF65-F5344CB8AC3E}">
         <p14:creationId xmlns:p14="http://schemas.microsoft.com/office/powerpoint/2010/main" val="3497731416"/>
+      </p:ext>
+    </p:extLst>
+  </p:cSld>
+  <p:clrMapOvr>
+    <a:masterClrMapping/>
+  </p:clrMapOvr>
+</p:sld>
+</file>
+
+<file path=ppt/slides/slide12.xml><?xml version="1.0" encoding="utf-8"?>
+<p:sld xmlns:a="http://schemas.openxmlformats.org/drawingml/2006/main" xmlns:r="http://schemas.openxmlformats.org/officeDocument/2006/relationships" xmlns:p="http://schemas.openxmlformats.org/presentationml/2006/main">
+  <p:cSld>
+    <p:spTree>
+      <p:nvGrpSpPr>
+        <p:cNvPr id="1" name=""/>
+        <p:cNvGrpSpPr/>
+        <p:nvPr/>
+      </p:nvGrpSpPr>
+      <p:grpSpPr>
+        <a:xfrm>
+          <a:off x="0" y="0"/>
+          <a:ext cx="0" cy="0"/>
+          <a:chOff x="0" y="0"/>
+          <a:chExt cx="0" cy="0"/>
+        </a:xfrm>
+      </p:grpSpPr>
+      <p:sp>
+        <p:nvSpPr>
+          <p:cNvPr id="2" name="Title 1">
+            <a:extLst>
+              <a:ext uri="{FF2B5EF4-FFF2-40B4-BE49-F238E27FC236}">
+                <a16:creationId xmlns:a16="http://schemas.microsoft.com/office/drawing/2014/main" id="{BFFBF79B-3C6A-8CCC-3BC3-EB177C40A349}"/>
+              </a:ext>
+            </a:extLst>
+          </p:cNvPr>
+          <p:cNvSpPr>
+            <a:spLocks noGrp="1"/>
+          </p:cNvSpPr>
+          <p:nvPr>
+            <p:ph type="ctrTitle"/>
+          </p:nvPr>
+        </p:nvSpPr>
+        <p:spPr/>
+        <p:txBody>
+          <a:bodyPr/>
+          <a:lstStyle/>
+          <a:p>
+            <a:r>
+              <a:rPr lang="en-US" dirty="0"/>
+              <a:t>Machine Learning</a:t>
+            </a:r>
+          </a:p>
+        </p:txBody>
+      </p:sp>
+    </p:spTree>
+    <p:extLst>
+      <p:ext uri="{BB962C8B-B14F-4D97-AF65-F5344CB8AC3E}">
+        <p14:creationId xmlns:p14="http://schemas.microsoft.com/office/powerpoint/2010/main" val="1479370202"/>
+      </p:ext>
+    </p:extLst>
+  </p:cSld>
+  <p:clrMapOvr>
+    <a:masterClrMapping/>
+  </p:clrMapOvr>
+</p:sld>
+</file>
+
+<file path=ppt/slides/slide13.xml><?xml version="1.0" encoding="utf-8"?>
+<p:sld xmlns:a="http://schemas.openxmlformats.org/drawingml/2006/main" xmlns:r="http://schemas.openxmlformats.org/officeDocument/2006/relationships" xmlns:p="http://schemas.openxmlformats.org/presentationml/2006/main">
+  <p:cSld>
+    <p:spTree>
+      <p:nvGrpSpPr>
+        <p:cNvPr id="1" name=""/>
+        <p:cNvGrpSpPr/>
+        <p:nvPr/>
+      </p:nvGrpSpPr>
+      <p:grpSpPr>
+        <a:xfrm>
+          <a:off x="0" y="0"/>
+          <a:ext cx="0" cy="0"/>
+          <a:chOff x="0" y="0"/>
+          <a:chExt cx="0" cy="0"/>
+        </a:xfrm>
+      </p:grpSpPr>
+      <p:sp>
+        <p:nvSpPr>
+          <p:cNvPr id="3" name="Title 1">
+            <a:extLst>
+              <a:ext uri="{FF2B5EF4-FFF2-40B4-BE49-F238E27FC236}">
+                <a16:creationId xmlns:a16="http://schemas.microsoft.com/office/drawing/2014/main" id="{374877E5-C7B9-52A7-FF01-34D543D76636}"/>
+              </a:ext>
+            </a:extLst>
+          </p:cNvPr>
+          <p:cNvSpPr txBox="1">
+            <a:spLocks/>
+          </p:cNvSpPr>
+          <p:nvPr/>
+        </p:nvSpPr>
+        <p:spPr>
+          <a:xfrm>
+            <a:off x="306572" y="258898"/>
+            <a:ext cx="12469091" cy="464215"/>
+          </a:xfrm>
+          <a:prstGeom prst="rect">
+            <a:avLst/>
+          </a:prstGeom>
+        </p:spPr>
+        <p:txBody>
+          <a:bodyPr vert="horz" lIns="91440" tIns="45720" rIns="91440" bIns="45720" rtlCol="0" anchor="b">
+            <a:normAutofit fontScale="82500" lnSpcReduction="20000"/>
+          </a:bodyPr>
+          <a:lstStyle>
+            <a:lvl1pPr algn="ctr" defTabSz="914400" rtl="0" eaLnBrk="1" latinLnBrk="0" hangingPunct="1">
+              <a:lnSpc>
+                <a:spcPct val="90000"/>
+              </a:lnSpc>
+              <a:spcBef>
+                <a:spcPct val="0"/>
+              </a:spcBef>
+              <a:buNone/>
+              <a:defRPr sz="6000" kern="1200">
+                <a:solidFill>
+                  <a:schemeClr val="tx1"/>
+                </a:solidFill>
+                <a:latin typeface="+mj-lt"/>
+                <a:ea typeface="+mj-ea"/>
+                <a:cs typeface="+mj-cs"/>
+              </a:defRPr>
+            </a:lvl1pPr>
+          </a:lstStyle>
+          <a:p>
+            <a:pPr algn="l"/>
+            <a:r>
+              <a:rPr lang="en-US" sz="3600" b="1" dirty="0"/>
+              <a:t>Key questions and steps for ML</a:t>
+            </a:r>
+          </a:p>
+        </p:txBody>
+      </p:sp>
+      <p:sp>
+        <p:nvSpPr>
+          <p:cNvPr id="8" name="TextBox 7">
+            <a:extLst>
+              <a:ext uri="{FF2B5EF4-FFF2-40B4-BE49-F238E27FC236}">
+                <a16:creationId xmlns:a16="http://schemas.microsoft.com/office/drawing/2014/main" id="{53FCBEEC-33DD-D8C7-B59D-E071066AEC7C}"/>
+              </a:ext>
+            </a:extLst>
+          </p:cNvPr>
+          <p:cNvSpPr txBox="1"/>
+          <p:nvPr/>
+        </p:nvSpPr>
+        <p:spPr>
+          <a:xfrm>
+            <a:off x="306572" y="1038554"/>
+            <a:ext cx="11566114" cy="5262979"/>
+          </a:xfrm>
+          <a:prstGeom prst="rect">
+            <a:avLst/>
+          </a:prstGeom>
+          <a:noFill/>
+        </p:spPr>
+        <p:txBody>
+          <a:bodyPr wrap="square">
+            <a:spAutoFit/>
+          </a:bodyPr>
+          <a:lstStyle/>
+          <a:p>
+            <a:r>
+              <a:rPr lang="en-US" sz="2400" b="1" dirty="0"/>
+              <a:t>Step 1 </a:t>
+            </a:r>
+            <a:r>
+              <a:rPr lang="en-US" sz="2400" dirty="0"/>
+              <a:t>: Define the problem or question</a:t>
+            </a:r>
+          </a:p>
+          <a:p>
+            <a:r>
+              <a:rPr lang="en-US" sz="2400" b="1" dirty="0"/>
+              <a:t>Ans 1 : </a:t>
+            </a:r>
+            <a:r>
+              <a:rPr lang="en-US" sz="2400" dirty="0"/>
+              <a:t>Based on the credit card client data set –predict if the person is going to be defaulted next month or not</a:t>
+            </a:r>
+          </a:p>
+          <a:p>
+            <a:r>
+              <a:rPr lang="en-US" sz="2400" b="1" dirty="0"/>
+              <a:t>Step 2: </a:t>
+            </a:r>
+            <a:r>
+              <a:rPr lang="en-US" sz="2400" dirty="0"/>
+              <a:t>Find the data</a:t>
+            </a:r>
+          </a:p>
+          <a:p>
+            <a:r>
+              <a:rPr lang="en-US" sz="2400" b="1" dirty="0"/>
+              <a:t>Ans 2 </a:t>
+            </a:r>
+            <a:r>
+              <a:rPr lang="en-US" sz="2400" dirty="0"/>
+              <a:t>: Data from universal data Set as suggested by </a:t>
+            </a:r>
+            <a:r>
+              <a:rPr lang="en-US" sz="2400" dirty="0" err="1"/>
+              <a:t>Laks</a:t>
+            </a:r>
+            <a:endParaRPr lang="en-US" sz="2400" dirty="0"/>
+          </a:p>
+          <a:p>
+            <a:r>
+              <a:rPr lang="en-US" sz="2400" b="1" dirty="0"/>
+              <a:t>Step 3 &amp; 4 &amp; 5 : </a:t>
+            </a:r>
+            <a:r>
+              <a:rPr lang="en-US" sz="2400" dirty="0"/>
+              <a:t>Read , clean and EDA + Prepare the data</a:t>
+            </a:r>
+          </a:p>
+          <a:p>
+            <a:r>
+              <a:rPr lang="en-US" sz="2400" b="1" dirty="0"/>
+              <a:t>Ans 3 &amp; 4 &amp; 5 : </a:t>
+            </a:r>
+            <a:r>
+              <a:rPr lang="en-US" sz="2400" dirty="0"/>
+              <a:t>As per Mini Project 1 and above slides the data</a:t>
+            </a:r>
+          </a:p>
+          <a:p>
+            <a:r>
+              <a:rPr lang="en-US" sz="2400" b="1" dirty="0"/>
+              <a:t>Step 6 : </a:t>
+            </a:r>
+            <a:r>
+              <a:rPr lang="en-US" sz="2400" dirty="0"/>
+              <a:t>Modelling</a:t>
+            </a:r>
+          </a:p>
+          <a:p>
+            <a:r>
+              <a:rPr lang="en-US" sz="2400" b="1" dirty="0"/>
+              <a:t>Ans 6 : </a:t>
+            </a:r>
+            <a:r>
+              <a:rPr lang="en-US" sz="2400" dirty="0"/>
+              <a:t>Input features are all the columns because I am using </a:t>
+            </a:r>
+            <a:r>
+              <a:rPr lang="en-US" sz="2400" dirty="0" err="1"/>
+              <a:t>gridsearch</a:t>
+            </a:r>
+            <a:r>
+              <a:rPr lang="en-US" sz="2400" dirty="0"/>
+              <a:t> and hyperparameter tunning. Output variable </a:t>
+            </a:r>
+            <a:r>
+              <a:rPr lang="en-US" sz="2400" dirty="0" err="1"/>
+              <a:t>Def_Pay</a:t>
+            </a:r>
+            <a:r>
+              <a:rPr lang="en-US" sz="2400" dirty="0"/>
+              <a:t> 0 or 1 , which is Binary , hence used classification Models and used Supervised learning. Ran all the models we know so far and captured the results. </a:t>
+            </a:r>
+          </a:p>
+          <a:p>
+            <a:r>
+              <a:rPr lang="en-US" sz="2400" dirty="0"/>
+              <a:t>	</a:t>
+            </a:r>
+            <a:r>
+              <a:rPr lang="en-NZ" sz="2400" b="1" dirty="0"/>
+              <a:t>models = ['</a:t>
+            </a:r>
+            <a:r>
+              <a:rPr lang="en-NZ" sz="2400" b="1" dirty="0" err="1"/>
+              <a:t>LogisticRegression</a:t>
+            </a:r>
+            <a:r>
+              <a:rPr lang="en-NZ" sz="2400" b="1" dirty="0"/>
+              <a:t>', '</a:t>
+            </a:r>
+            <a:r>
+              <a:rPr lang="en-NZ" sz="2400" b="1" dirty="0" err="1"/>
+              <a:t>DecisionTree</a:t>
+            </a:r>
+            <a:r>
+              <a:rPr lang="en-NZ" sz="2400" b="1" dirty="0"/>
+              <a:t>', '</a:t>
+            </a:r>
+            <a:r>
+              <a:rPr lang="en-NZ" sz="2400" b="1" dirty="0" err="1"/>
+              <a:t>RandomForest</a:t>
+            </a:r>
+            <a:r>
+              <a:rPr lang="en-NZ" sz="2400" b="1" dirty="0"/>
+              <a:t>', '</a:t>
+            </a:r>
+            <a:r>
+              <a:rPr lang="en-NZ" sz="2400" b="1" dirty="0" err="1"/>
+              <a:t>KNeighbors</a:t>
+            </a:r>
+            <a:r>
+              <a:rPr lang="en-NZ" sz="2400" b="1" dirty="0"/>
+              <a:t>’, 	'AdaBoost', '</a:t>
+            </a:r>
+            <a:r>
+              <a:rPr lang="en-NZ" sz="2400" b="1" dirty="0" err="1"/>
+              <a:t>XGBoost</a:t>
+            </a:r>
+            <a:r>
+              <a:rPr lang="en-NZ" sz="2400" b="1" dirty="0"/>
+              <a:t>', 'Bagging', 'Stacking</a:t>
+            </a:r>
+            <a:r>
+              <a:rPr lang="en-NZ" sz="2400" dirty="0"/>
+              <a:t>']</a:t>
+            </a:r>
+          </a:p>
+        </p:txBody>
+      </p:sp>
+    </p:spTree>
+    <p:extLst>
+      <p:ext uri="{BB962C8B-B14F-4D97-AF65-F5344CB8AC3E}">
+        <p14:creationId xmlns:p14="http://schemas.microsoft.com/office/powerpoint/2010/main" val="144585572"/>
+      </p:ext>
+    </p:extLst>
+  </p:cSld>
+  <p:clrMapOvr>
+    <a:masterClrMapping/>
+  </p:clrMapOvr>
+</p:sld>
+</file>
+
+<file path=ppt/slides/slide14.xml><?xml version="1.0" encoding="utf-8"?>
+<p:sld xmlns:a="http://schemas.openxmlformats.org/drawingml/2006/main" xmlns:r="http://schemas.openxmlformats.org/officeDocument/2006/relationships" xmlns:p="http://schemas.openxmlformats.org/presentationml/2006/main">
+  <p:cSld>
+    <p:spTree>
+      <p:nvGrpSpPr>
+        <p:cNvPr id="1" name=""/>
+        <p:cNvGrpSpPr/>
+        <p:nvPr/>
+      </p:nvGrpSpPr>
+      <p:grpSpPr>
+        <a:xfrm>
+          <a:off x="0" y="0"/>
+          <a:ext cx="0" cy="0"/>
+          <a:chOff x="0" y="0"/>
+          <a:chExt cx="0" cy="0"/>
+        </a:xfrm>
+      </p:grpSpPr>
+      <p:sp>
+        <p:nvSpPr>
+          <p:cNvPr id="3" name="Title 1">
+            <a:extLst>
+              <a:ext uri="{FF2B5EF4-FFF2-40B4-BE49-F238E27FC236}">
+                <a16:creationId xmlns:a16="http://schemas.microsoft.com/office/drawing/2014/main" id="{374877E5-C7B9-52A7-FF01-34D543D76636}"/>
+              </a:ext>
+            </a:extLst>
+          </p:cNvPr>
+          <p:cNvSpPr txBox="1">
+            <a:spLocks/>
+          </p:cNvSpPr>
+          <p:nvPr/>
+        </p:nvSpPr>
+        <p:spPr>
+          <a:xfrm>
+            <a:off x="306572" y="258898"/>
+            <a:ext cx="12469091" cy="464215"/>
+          </a:xfrm>
+          <a:prstGeom prst="rect">
+            <a:avLst/>
+          </a:prstGeom>
+        </p:spPr>
+        <p:txBody>
+          <a:bodyPr vert="horz" lIns="91440" tIns="45720" rIns="91440" bIns="45720" rtlCol="0" anchor="b">
+            <a:normAutofit fontScale="82500" lnSpcReduction="20000"/>
+          </a:bodyPr>
+          <a:lstStyle>
+            <a:lvl1pPr algn="ctr" defTabSz="914400" rtl="0" eaLnBrk="1" latinLnBrk="0" hangingPunct="1">
+              <a:lnSpc>
+                <a:spcPct val="90000"/>
+              </a:lnSpc>
+              <a:spcBef>
+                <a:spcPct val="0"/>
+              </a:spcBef>
+              <a:buNone/>
+              <a:defRPr sz="6000" kern="1200">
+                <a:solidFill>
+                  <a:schemeClr val="tx1"/>
+                </a:solidFill>
+                <a:latin typeface="+mj-lt"/>
+                <a:ea typeface="+mj-ea"/>
+                <a:cs typeface="+mj-cs"/>
+              </a:defRPr>
+            </a:lvl1pPr>
+          </a:lstStyle>
+          <a:p>
+            <a:pPr algn="l"/>
+            <a:r>
+              <a:rPr lang="en-US" sz="3600" b="1" dirty="0" err="1"/>
+              <a:t>LogisticRegression</a:t>
+            </a:r>
+            <a:endParaRPr lang="en-US" sz="3600" b="1" dirty="0"/>
+          </a:p>
+        </p:txBody>
+      </p:sp>
+      <p:pic>
+        <p:nvPicPr>
+          <p:cNvPr id="2" name="Picture 1">
+            <a:extLst>
+              <a:ext uri="{FF2B5EF4-FFF2-40B4-BE49-F238E27FC236}">
+                <a16:creationId xmlns:a16="http://schemas.microsoft.com/office/drawing/2014/main" id="{7EFAA2E7-161D-F1B5-D4EB-8DC4F096751D}"/>
+              </a:ext>
+            </a:extLst>
+          </p:cNvPr>
+          <p:cNvPicPr>
+            <a:picLocks noChangeAspect="1"/>
+          </p:cNvPicPr>
+          <p:nvPr/>
+        </p:nvPicPr>
+        <p:blipFill>
+          <a:blip r:embed="rId3"/>
+          <a:stretch>
+            <a:fillRect/>
+          </a:stretch>
+        </p:blipFill>
+        <p:spPr>
+          <a:xfrm>
+            <a:off x="242854" y="856343"/>
+            <a:ext cx="4007538" cy="3133344"/>
+          </a:xfrm>
+          <a:prstGeom prst="rect">
+            <a:avLst/>
+          </a:prstGeom>
+          <a:ln>
+            <a:solidFill>
+              <a:schemeClr val="accent1"/>
+            </a:solidFill>
+          </a:ln>
+        </p:spPr>
+      </p:pic>
+      <p:pic>
+        <p:nvPicPr>
+          <p:cNvPr id="4" name="Picture 3">
+            <a:extLst>
+              <a:ext uri="{FF2B5EF4-FFF2-40B4-BE49-F238E27FC236}">
+                <a16:creationId xmlns:a16="http://schemas.microsoft.com/office/drawing/2014/main" id="{0EF0A784-700C-574F-CFDB-032A160881BF}"/>
+              </a:ext>
+            </a:extLst>
+          </p:cNvPr>
+          <p:cNvPicPr>
+            <a:picLocks noChangeAspect="1"/>
+          </p:cNvPicPr>
+          <p:nvPr/>
+        </p:nvPicPr>
+        <p:blipFill>
+          <a:blip r:embed="rId4"/>
+          <a:stretch>
+            <a:fillRect/>
+          </a:stretch>
+        </p:blipFill>
+        <p:spPr>
+          <a:xfrm>
+            <a:off x="5073724" y="891328"/>
+            <a:ext cx="4007538" cy="2979964"/>
+          </a:xfrm>
+          <a:prstGeom prst="rect">
+            <a:avLst/>
+          </a:prstGeom>
+          <a:ln>
+            <a:solidFill>
+              <a:schemeClr val="accent1"/>
+            </a:solidFill>
+          </a:ln>
+        </p:spPr>
+      </p:pic>
+      <p:pic>
+        <p:nvPicPr>
+          <p:cNvPr id="5" name="Picture 4">
+            <a:extLst>
+              <a:ext uri="{FF2B5EF4-FFF2-40B4-BE49-F238E27FC236}">
+                <a16:creationId xmlns:a16="http://schemas.microsoft.com/office/drawing/2014/main" id="{CC744D5B-7992-5530-0DD9-43A659A2FB9C}"/>
+              </a:ext>
+            </a:extLst>
+          </p:cNvPr>
+          <p:cNvPicPr>
+            <a:picLocks noChangeAspect="1"/>
+          </p:cNvPicPr>
+          <p:nvPr/>
+        </p:nvPicPr>
+        <p:blipFill>
+          <a:blip r:embed="rId5"/>
+          <a:stretch>
+            <a:fillRect/>
+          </a:stretch>
+        </p:blipFill>
+        <p:spPr>
+          <a:xfrm>
+            <a:off x="193034" y="4039507"/>
+            <a:ext cx="4318334" cy="2818493"/>
+          </a:xfrm>
+          <a:prstGeom prst="rect">
+            <a:avLst/>
+          </a:prstGeom>
+          <a:ln>
+            <a:solidFill>
+              <a:schemeClr val="accent1"/>
+            </a:solidFill>
+          </a:ln>
+        </p:spPr>
+      </p:pic>
+    </p:spTree>
+    <p:extLst>
+      <p:ext uri="{BB962C8B-B14F-4D97-AF65-F5344CB8AC3E}">
+        <p14:creationId xmlns:p14="http://schemas.microsoft.com/office/powerpoint/2010/main" val="3512240919"/>
       </p:ext>
     </p:extLst>
   </p:cSld>

</xml_diff>